<commit_message>
Figure 4 improved, bbl file removed from git
</commit_message>
<xml_diff>
--- a/images_pvis/mt_gen.pptx
+++ b/images_pvis/mt_gen.pptx
@@ -192,7 +192,7 @@
           <a:p>
             <a:fld id="{1DC76BE9-ED94-4F02-A8F6-3B0D26FC924E}" type="datetimeFigureOut">
               <a:rPr lang="en-US" smtClean="0"/>
-              <a:t>9/25/2014</a:t>
+              <a:t>12/10/2014</a:t>
             </a:fld>
             <a:endParaRPr lang="en-US"/>
           </a:p>
@@ -725,7 +725,7 @@
           <a:p>
             <a:fld id="{0F712C90-6D67-4812-8C3C-842B0CBDEA41}" type="datetimeFigureOut">
               <a:rPr lang="en-US" smtClean="0"/>
-              <a:t>9/25/2014</a:t>
+              <a:t>12/10/2014</a:t>
             </a:fld>
             <a:endParaRPr lang="en-US"/>
           </a:p>
@@ -895,7 +895,7 @@
           <a:p>
             <a:fld id="{0F712C90-6D67-4812-8C3C-842B0CBDEA41}" type="datetimeFigureOut">
               <a:rPr lang="en-US" smtClean="0"/>
-              <a:t>9/25/2014</a:t>
+              <a:t>12/10/2014</a:t>
             </a:fld>
             <a:endParaRPr lang="en-US"/>
           </a:p>
@@ -1075,7 +1075,7 @@
           <a:p>
             <a:fld id="{0F712C90-6D67-4812-8C3C-842B0CBDEA41}" type="datetimeFigureOut">
               <a:rPr lang="en-US" smtClean="0"/>
-              <a:t>9/25/2014</a:t>
+              <a:t>12/10/2014</a:t>
             </a:fld>
             <a:endParaRPr lang="en-US"/>
           </a:p>
@@ -1245,7 +1245,7 @@
           <a:p>
             <a:fld id="{0F712C90-6D67-4812-8C3C-842B0CBDEA41}" type="datetimeFigureOut">
               <a:rPr lang="en-US" smtClean="0"/>
-              <a:t>9/25/2014</a:t>
+              <a:t>12/10/2014</a:t>
             </a:fld>
             <a:endParaRPr lang="en-US"/>
           </a:p>
@@ -1491,7 +1491,7 @@
           <a:p>
             <a:fld id="{0F712C90-6D67-4812-8C3C-842B0CBDEA41}" type="datetimeFigureOut">
               <a:rPr lang="en-US" smtClean="0"/>
-              <a:t>9/25/2014</a:t>
+              <a:t>12/10/2014</a:t>
             </a:fld>
             <a:endParaRPr lang="en-US"/>
           </a:p>
@@ -1779,7 +1779,7 @@
           <a:p>
             <a:fld id="{0F712C90-6D67-4812-8C3C-842B0CBDEA41}" type="datetimeFigureOut">
               <a:rPr lang="en-US" smtClean="0"/>
-              <a:t>9/25/2014</a:t>
+              <a:t>12/10/2014</a:t>
             </a:fld>
             <a:endParaRPr lang="en-US"/>
           </a:p>
@@ -2206,7 +2206,7 @@
           <a:p>
             <a:fld id="{0F712C90-6D67-4812-8C3C-842B0CBDEA41}" type="datetimeFigureOut">
               <a:rPr lang="en-US" smtClean="0"/>
-              <a:t>9/25/2014</a:t>
+              <a:t>12/10/2014</a:t>
             </a:fld>
             <a:endParaRPr lang="en-US"/>
           </a:p>
@@ -2324,7 +2324,7 @@
           <a:p>
             <a:fld id="{0F712C90-6D67-4812-8C3C-842B0CBDEA41}" type="datetimeFigureOut">
               <a:rPr lang="en-US" smtClean="0"/>
-              <a:t>9/25/2014</a:t>
+              <a:t>12/10/2014</a:t>
             </a:fld>
             <a:endParaRPr lang="en-US"/>
           </a:p>
@@ -2419,7 +2419,7 @@
           <a:p>
             <a:fld id="{0F712C90-6D67-4812-8C3C-842B0CBDEA41}" type="datetimeFigureOut">
               <a:rPr lang="en-US" smtClean="0"/>
-              <a:t>9/25/2014</a:t>
+              <a:t>12/10/2014</a:t>
             </a:fld>
             <a:endParaRPr lang="en-US"/>
           </a:p>
@@ -2696,7 +2696,7 @@
           <a:p>
             <a:fld id="{0F712C90-6D67-4812-8C3C-842B0CBDEA41}" type="datetimeFigureOut">
               <a:rPr lang="en-US" smtClean="0"/>
-              <a:t>9/25/2014</a:t>
+              <a:t>12/10/2014</a:t>
             </a:fld>
             <a:endParaRPr lang="en-US"/>
           </a:p>
@@ -2949,7 +2949,7 @@
           <a:p>
             <a:fld id="{0F712C90-6D67-4812-8C3C-842B0CBDEA41}" type="datetimeFigureOut">
               <a:rPr lang="en-US" smtClean="0"/>
-              <a:t>9/25/2014</a:t>
+              <a:t>12/10/2014</a:t>
             </a:fld>
             <a:endParaRPr lang="en-US"/>
           </a:p>
@@ -3162,7 +3162,7 @@
           <a:p>
             <a:fld id="{0F712C90-6D67-4812-8C3C-842B0CBDEA41}" type="datetimeFigureOut">
               <a:rPr lang="en-US" smtClean="0"/>
-              <a:t>9/25/2014</a:t>
+              <a:t>12/10/2014</a:t>
             </a:fld>
             <a:endParaRPr lang="en-US"/>
           </a:p>
@@ -3537,93 +3537,6 @@
           <a:chExt cx="0" cy="0"/>
         </a:xfrm>
       </p:grpSpPr>
-      <p:pic>
-        <p:nvPicPr>
-          <p:cNvPr id="85" name="Picture 84"/>
-          <p:cNvPicPr>
-            <a:picLocks noChangeAspect="1"/>
-          </p:cNvPicPr>
-          <p:nvPr/>
-        </p:nvPicPr>
-        <p:blipFill rotWithShape="1">
-          <a:blip r:embed="rId3">
-            <a:extLst>
-              <a:ext uri="{28A0092B-C50C-407E-A947-70E740481C1C}">
-                <a14:useLocalDpi xmlns:a14="http://schemas.microsoft.com/office/drawing/2010/main" val="0"/>
-              </a:ext>
-            </a:extLst>
-          </a:blip>
-          <a:srcRect r="26306"/>
-          <a:stretch/>
-        </p:blipFill>
-        <p:spPr>
-          <a:xfrm>
-            <a:off x="10453672" y="53274"/>
-            <a:ext cx="3613682" cy="5034984"/>
-          </a:xfrm>
-          <a:prstGeom prst="rect">
-            <a:avLst/>
-          </a:prstGeom>
-        </p:spPr>
-      </p:pic>
-      <p:pic>
-        <p:nvPicPr>
-          <p:cNvPr id="86" name="Picture 85"/>
-          <p:cNvPicPr>
-            <a:picLocks noChangeAspect="1"/>
-          </p:cNvPicPr>
-          <p:nvPr/>
-        </p:nvPicPr>
-        <p:blipFill rotWithShape="1">
-          <a:blip r:embed="rId3">
-            <a:extLst>
-              <a:ext uri="{28A0092B-C50C-407E-A947-70E740481C1C}">
-                <a14:useLocalDpi xmlns:a14="http://schemas.microsoft.com/office/drawing/2010/main" val="0"/>
-              </a:ext>
-            </a:extLst>
-          </a:blip>
-          <a:srcRect l="15360" t="14814" r="26306"/>
-          <a:stretch/>
-        </p:blipFill>
-        <p:spPr>
-          <a:xfrm>
-            <a:off x="8929504" y="3711892"/>
-            <a:ext cx="2860461" cy="4289108"/>
-          </a:xfrm>
-          <a:prstGeom prst="rect">
-            <a:avLst/>
-          </a:prstGeom>
-        </p:spPr>
-      </p:pic>
-      <p:pic>
-        <p:nvPicPr>
-          <p:cNvPr id="87" name="Picture 86"/>
-          <p:cNvPicPr>
-            <a:picLocks noChangeAspect="1"/>
-          </p:cNvPicPr>
-          <p:nvPr/>
-        </p:nvPicPr>
-        <p:blipFill rotWithShape="1">
-          <a:blip r:embed="rId3">
-            <a:extLst>
-              <a:ext uri="{28A0092B-C50C-407E-A947-70E740481C1C}">
-                <a14:useLocalDpi xmlns:a14="http://schemas.microsoft.com/office/drawing/2010/main" val="0"/>
-              </a:ext>
-            </a:extLst>
-          </a:blip>
-          <a:srcRect t="26213" r="26306"/>
-          <a:stretch/>
-        </p:blipFill>
-        <p:spPr>
-          <a:xfrm>
-            <a:off x="9317690" y="2538037"/>
-            <a:ext cx="3613682" cy="3715162"/>
-          </a:xfrm>
-          <a:prstGeom prst="rect">
-            <a:avLst/>
-          </a:prstGeom>
-        </p:spPr>
-      </p:pic>
       <p:sp>
         <p:nvSpPr>
           <p:cNvPr id="90" name="Rectangle 89"/>
@@ -4614,153 +4527,6 @@
           </a:p>
         </p:txBody>
       </p:sp>
-      <p:sp>
-        <p:nvSpPr>
-          <p:cNvPr id="94" name="Left Brace 93"/>
-          <p:cNvSpPr/>
-          <p:nvPr/>
-        </p:nvSpPr>
-        <p:spPr>
-          <a:xfrm rot="13514772">
-            <a:off x="11063856" y="4436036"/>
-            <a:ext cx="461482" cy="3253171"/>
-          </a:xfrm>
-          <a:prstGeom prst="leftBrace">
-            <a:avLst>
-              <a:gd name="adj1" fmla="val 42195"/>
-              <a:gd name="adj2" fmla="val 52127"/>
-            </a:avLst>
-          </a:prstGeom>
-          <a:ln w="76200" cap="sq">
-            <a:solidFill>
-              <a:schemeClr val="accent1">
-                <a:lumMod val="50000"/>
-              </a:schemeClr>
-            </a:solidFill>
-            <a:round/>
-            <a:headEnd w="lg" len="lg"/>
-          </a:ln>
-        </p:spPr>
-        <p:style>
-          <a:lnRef idx="1">
-            <a:schemeClr val="accent1"/>
-          </a:lnRef>
-          <a:fillRef idx="0">
-            <a:schemeClr val="accent1"/>
-          </a:fillRef>
-          <a:effectRef idx="0">
-            <a:schemeClr val="accent1"/>
-          </a:effectRef>
-          <a:fontRef idx="minor">
-            <a:schemeClr val="tx1"/>
-          </a:fontRef>
-        </p:style>
-        <p:txBody>
-          <a:bodyPr rtlCol="0" anchor="ctr"/>
-          <a:lstStyle/>
-          <a:p>
-            <a:pPr algn="ctr"/>
-            <a:endParaRPr lang="en-US">
-              <a:solidFill>
-                <a:srgbClr val="238B45"/>
-              </a:solidFill>
-            </a:endParaRPr>
-          </a:p>
-        </p:txBody>
-      </p:sp>
-      <p:sp>
-        <p:nvSpPr>
-          <p:cNvPr id="95" name="TextBox 94"/>
-          <p:cNvSpPr txBox="1"/>
-          <p:nvPr/>
-        </p:nvSpPr>
-        <p:spPr>
-          <a:xfrm>
-            <a:off x="11396208" y="6121303"/>
-            <a:ext cx="1535164" cy="935242"/>
-          </a:xfrm>
-          <a:prstGeom prst="rect">
-            <a:avLst/>
-          </a:prstGeom>
-          <a:noFill/>
-        </p:spPr>
-        <p:txBody>
-          <a:bodyPr wrap="square" rtlCol="0">
-            <a:spAutoFit/>
-          </a:bodyPr>
-          <a:lstStyle/>
-          <a:p>
-            <a:r>
-              <a:rPr lang="en-US" sz="6000" b="1" dirty="0" smtClean="0">
-                <a:solidFill>
-                  <a:schemeClr val="accent1">
-                    <a:lumMod val="50000"/>
-                  </a:schemeClr>
-                </a:solidFill>
-              </a:rPr>
-              <a:t>Dist</a:t>
-            </a:r>
-            <a:endParaRPr lang="en-US" sz="6000" b="1" dirty="0">
-              <a:solidFill>
-                <a:schemeClr val="accent1">
-                  <a:lumMod val="50000"/>
-                </a:schemeClr>
-              </a:solidFill>
-            </a:endParaRPr>
-          </a:p>
-        </p:txBody>
-      </p:sp>
-      <p:sp>
-        <p:nvSpPr>
-          <p:cNvPr id="96" name="Oval 95"/>
-          <p:cNvSpPr>
-            <a:spLocks noChangeAspect="1"/>
-          </p:cNvSpPr>
-          <p:nvPr/>
-        </p:nvSpPr>
-        <p:spPr>
-          <a:xfrm>
-            <a:off x="11023600" y="2925804"/>
-            <a:ext cx="1850633" cy="1900196"/>
-          </a:xfrm>
-          <a:prstGeom prst="ellipse">
-            <a:avLst/>
-          </a:prstGeom>
-          <a:noFill/>
-          <a:ln w="76200">
-            <a:solidFill>
-              <a:schemeClr val="accent1">
-                <a:lumMod val="50000"/>
-              </a:schemeClr>
-            </a:solidFill>
-            <a:prstDash val="sysDash"/>
-          </a:ln>
-        </p:spPr>
-        <p:style>
-          <a:lnRef idx="2">
-            <a:schemeClr val="accent1">
-              <a:shade val="50000"/>
-            </a:schemeClr>
-          </a:lnRef>
-          <a:fillRef idx="1">
-            <a:schemeClr val="accent1"/>
-          </a:fillRef>
-          <a:effectRef idx="0">
-            <a:schemeClr val="accent1"/>
-          </a:effectRef>
-          <a:fontRef idx="minor">
-            <a:schemeClr val="lt1"/>
-          </a:fontRef>
-        </p:style>
-        <p:txBody>
-          <a:bodyPr rtlCol="0" anchor="ctr"/>
-          <a:lstStyle/>
-          <a:p>
-            <a:pPr algn="ctr"/>
-            <a:endParaRPr lang="en-US"/>
-          </a:p>
-        </p:txBody>
-      </p:sp>
       <p:cxnSp>
         <p:nvCxnSpPr>
           <p:cNvPr id="97" name="Straight Connector 96"/>
@@ -4775,86 +4541,6 @@
           <a:prstGeom prst="line">
             <a:avLst/>
           </a:prstGeom>
-        </p:spPr>
-        <p:style>
-          <a:lnRef idx="1">
-            <a:schemeClr val="accent1"/>
-          </a:lnRef>
-          <a:fillRef idx="0">
-            <a:schemeClr val="accent1"/>
-          </a:fillRef>
-          <a:effectRef idx="0">
-            <a:schemeClr val="accent1"/>
-          </a:effectRef>
-          <a:fontRef idx="minor">
-            <a:schemeClr val="tx1"/>
-          </a:fontRef>
-        </p:style>
-      </p:cxnSp>
-      <p:cxnSp>
-        <p:nvCxnSpPr>
-          <p:cNvPr id="98" name="Straight Connector 97"/>
-          <p:cNvCxnSpPr>
-            <a:stCxn id="96" idx="0"/>
-          </p:cNvCxnSpPr>
-          <p:nvPr/>
-        </p:nvCxnSpPr>
-        <p:spPr>
-          <a:xfrm flipH="1" flipV="1">
-            <a:off x="6776122" y="2149405"/>
-            <a:ext cx="5172795" cy="776399"/>
-          </a:xfrm>
-          <a:prstGeom prst="line">
-            <a:avLst/>
-          </a:prstGeom>
-          <a:ln w="76200">
-            <a:solidFill>
-              <a:schemeClr val="accent1">
-                <a:lumMod val="50000"/>
-              </a:schemeClr>
-            </a:solidFill>
-            <a:prstDash val="sysDash"/>
-          </a:ln>
-        </p:spPr>
-        <p:style>
-          <a:lnRef idx="1">
-            <a:schemeClr val="accent1"/>
-          </a:lnRef>
-          <a:fillRef idx="0">
-            <a:schemeClr val="accent1"/>
-          </a:fillRef>
-          <a:effectRef idx="0">
-            <a:schemeClr val="accent1"/>
-          </a:effectRef>
-          <a:fontRef idx="minor">
-            <a:schemeClr val="tx1"/>
-          </a:fontRef>
-        </p:style>
-      </p:cxnSp>
-      <p:cxnSp>
-        <p:nvCxnSpPr>
-          <p:cNvPr id="99" name="Straight Connector 98"/>
-          <p:cNvCxnSpPr>
-            <a:stCxn id="96" idx="4"/>
-          </p:cNvCxnSpPr>
-          <p:nvPr/>
-        </p:nvCxnSpPr>
-        <p:spPr>
-          <a:xfrm flipH="1">
-            <a:off x="6776122" y="4826000"/>
-            <a:ext cx="5172795" cy="1418297"/>
-          </a:xfrm>
-          <a:prstGeom prst="line">
-            <a:avLst/>
-          </a:prstGeom>
-          <a:ln w="76200">
-            <a:solidFill>
-              <a:schemeClr val="accent1">
-                <a:lumMod val="50000"/>
-              </a:schemeClr>
-            </a:solidFill>
-            <a:prstDash val="sysDash"/>
-          </a:ln>
         </p:spPr>
         <p:style>
           <a:lnRef idx="1">
@@ -4923,62 +4609,6 @@
             <a:r>
               <a:rPr lang="en-US" sz="9600" dirty="0"/>
               <a:t>C</a:t>
-            </a:r>
-          </a:p>
-        </p:txBody>
-      </p:sp>
-      <p:sp>
-        <p:nvSpPr>
-          <p:cNvPr id="101" name="Teardrop 100"/>
-          <p:cNvSpPr>
-            <a:spLocks noChangeAspect="1"/>
-          </p:cNvSpPr>
-          <p:nvPr/>
-        </p:nvSpPr>
-        <p:spPr>
-          <a:xfrm rot="5400000">
-            <a:off x="8231207" y="0"/>
-            <a:ext cx="1179576" cy="1179576"/>
-          </a:xfrm>
-          <a:prstGeom prst="teardrop">
-            <a:avLst/>
-          </a:prstGeom>
-          <a:solidFill>
-            <a:srgbClr val="238B45"/>
-          </a:solidFill>
-          <a:ln>
-            <a:solidFill>
-              <a:schemeClr val="accent1">
-                <a:shade val="50000"/>
-                <a:alpha val="19000"/>
-              </a:schemeClr>
-            </a:solidFill>
-          </a:ln>
-        </p:spPr>
-        <p:style>
-          <a:lnRef idx="2">
-            <a:schemeClr val="accent1">
-              <a:shade val="50000"/>
-            </a:schemeClr>
-          </a:lnRef>
-          <a:fillRef idx="1">
-            <a:schemeClr val="accent1"/>
-          </a:fillRef>
-          <a:effectRef idx="0">
-            <a:schemeClr val="accent1"/>
-          </a:effectRef>
-          <a:fontRef idx="minor">
-            <a:schemeClr val="lt1"/>
-          </a:fontRef>
-        </p:style>
-        <p:txBody>
-          <a:bodyPr vert="vert270" rtlCol="0" anchor="ctr"/>
-          <a:lstStyle/>
-          <a:p>
-            <a:pPr algn="ctr"/>
-            <a:r>
-              <a:rPr lang="en-US" sz="9600" dirty="0"/>
-              <a:t>B</a:t>
             </a:r>
           </a:p>
         </p:txBody>
@@ -6507,7 +6137,7 @@
               <a:prstGeom prst="line">
                 <a:avLst/>
               </a:prstGeom>
-              <a:ln w="76200">
+              <a:ln w="76200" cap="rnd">
                 <a:solidFill>
                   <a:srgbClr val="000000">
                     <a:alpha val="10196"/>
@@ -6544,7 +6174,7 @@
               <a:prstGeom prst="line">
                 <a:avLst/>
               </a:prstGeom>
-              <a:ln w="76200">
+              <a:ln w="76200" cap="rnd">
                 <a:solidFill>
                   <a:srgbClr val="000000">
                     <a:alpha val="10196"/>
@@ -6581,7 +6211,7 @@
               <a:prstGeom prst="line">
                 <a:avLst/>
               </a:prstGeom>
-              <a:ln w="76200">
+              <a:ln w="76200" cap="rnd">
                 <a:solidFill>
                   <a:srgbClr val="000000">
                     <a:alpha val="10196"/>
@@ -6633,7 +6263,7 @@
               <a:prstGeom prst="line">
                 <a:avLst/>
               </a:prstGeom>
-              <a:ln w="76200">
+              <a:ln w="76200" cap="rnd">
                 <a:solidFill>
                   <a:srgbClr val="000000">
                     <a:alpha val="10196"/>
@@ -6670,7 +6300,7 @@
               <a:prstGeom prst="line">
                 <a:avLst/>
               </a:prstGeom>
-              <a:ln w="76200">
+              <a:ln w="76200" cap="rnd">
                 <a:solidFill>
                   <a:srgbClr val="000000">
                     <a:alpha val="10196"/>
@@ -6707,7 +6337,7 @@
               <a:prstGeom prst="line">
                 <a:avLst/>
               </a:prstGeom>
-              <a:ln w="76200">
+              <a:ln w="76200" cap="rnd">
                 <a:solidFill>
                   <a:srgbClr val="000000">
                     <a:alpha val="10196"/>
@@ -7956,6 +7586,1259 @@
           </a:p>
         </p:txBody>
       </p:sp>
+      <p:sp>
+        <p:nvSpPr>
+          <p:cNvPr id="94" name="Left Brace 93"/>
+          <p:cNvSpPr/>
+          <p:nvPr/>
+        </p:nvSpPr>
+        <p:spPr>
+          <a:xfrm rot="13514772">
+            <a:off x="11063856" y="4436036"/>
+            <a:ext cx="461482" cy="3253171"/>
+          </a:xfrm>
+          <a:prstGeom prst="leftBrace">
+            <a:avLst>
+              <a:gd name="adj1" fmla="val 42195"/>
+              <a:gd name="adj2" fmla="val 52127"/>
+            </a:avLst>
+          </a:prstGeom>
+          <a:ln w="76200" cap="sq">
+            <a:solidFill>
+              <a:schemeClr val="accent1">
+                <a:lumMod val="50000"/>
+              </a:schemeClr>
+            </a:solidFill>
+            <a:round/>
+            <a:headEnd w="lg" len="lg"/>
+          </a:ln>
+        </p:spPr>
+        <p:style>
+          <a:lnRef idx="1">
+            <a:schemeClr val="accent1"/>
+          </a:lnRef>
+          <a:fillRef idx="0">
+            <a:schemeClr val="accent1"/>
+          </a:fillRef>
+          <a:effectRef idx="0">
+            <a:schemeClr val="accent1"/>
+          </a:effectRef>
+          <a:fontRef idx="minor">
+            <a:schemeClr val="tx1"/>
+          </a:fontRef>
+        </p:style>
+        <p:txBody>
+          <a:bodyPr rtlCol="0" anchor="ctr"/>
+          <a:lstStyle/>
+          <a:p>
+            <a:pPr algn="ctr"/>
+            <a:endParaRPr lang="en-US">
+              <a:solidFill>
+                <a:srgbClr val="238B45"/>
+              </a:solidFill>
+            </a:endParaRPr>
+          </a:p>
+        </p:txBody>
+      </p:sp>
+      <p:sp>
+        <p:nvSpPr>
+          <p:cNvPr id="96" name="Oval 95"/>
+          <p:cNvSpPr>
+            <a:spLocks noChangeAspect="1"/>
+          </p:cNvSpPr>
+          <p:nvPr/>
+        </p:nvSpPr>
+        <p:spPr>
+          <a:xfrm>
+            <a:off x="11023600" y="2925804"/>
+            <a:ext cx="1850633" cy="1900196"/>
+          </a:xfrm>
+          <a:prstGeom prst="ellipse">
+            <a:avLst/>
+          </a:prstGeom>
+          <a:noFill/>
+          <a:ln w="76200">
+            <a:solidFill>
+              <a:schemeClr val="accent1">
+                <a:lumMod val="50000"/>
+              </a:schemeClr>
+            </a:solidFill>
+            <a:prstDash val="sysDash"/>
+          </a:ln>
+        </p:spPr>
+        <p:style>
+          <a:lnRef idx="2">
+            <a:schemeClr val="accent1">
+              <a:shade val="50000"/>
+            </a:schemeClr>
+          </a:lnRef>
+          <a:fillRef idx="1">
+            <a:schemeClr val="accent1"/>
+          </a:fillRef>
+          <a:effectRef idx="0">
+            <a:schemeClr val="accent1"/>
+          </a:effectRef>
+          <a:fontRef idx="minor">
+            <a:schemeClr val="lt1"/>
+          </a:fontRef>
+        </p:style>
+        <p:txBody>
+          <a:bodyPr rtlCol="0" anchor="ctr"/>
+          <a:lstStyle/>
+          <a:p>
+            <a:pPr algn="ctr"/>
+            <a:endParaRPr lang="en-US"/>
+          </a:p>
+        </p:txBody>
+      </p:sp>
+      <p:cxnSp>
+        <p:nvCxnSpPr>
+          <p:cNvPr id="98" name="Straight Connector 97"/>
+          <p:cNvCxnSpPr>
+            <a:stCxn id="96" idx="0"/>
+          </p:cNvCxnSpPr>
+          <p:nvPr/>
+        </p:nvCxnSpPr>
+        <p:spPr>
+          <a:xfrm flipH="1" flipV="1">
+            <a:off x="6776122" y="2149405"/>
+            <a:ext cx="5172795" cy="776399"/>
+          </a:xfrm>
+          <a:prstGeom prst="line">
+            <a:avLst/>
+          </a:prstGeom>
+          <a:ln w="76200">
+            <a:solidFill>
+              <a:schemeClr val="accent1">
+                <a:lumMod val="50000"/>
+              </a:schemeClr>
+            </a:solidFill>
+            <a:prstDash val="sysDash"/>
+          </a:ln>
+        </p:spPr>
+        <p:style>
+          <a:lnRef idx="1">
+            <a:schemeClr val="accent1"/>
+          </a:lnRef>
+          <a:fillRef idx="0">
+            <a:schemeClr val="accent1"/>
+          </a:fillRef>
+          <a:effectRef idx="0">
+            <a:schemeClr val="accent1"/>
+          </a:effectRef>
+          <a:fontRef idx="minor">
+            <a:schemeClr val="tx1"/>
+          </a:fontRef>
+        </p:style>
+      </p:cxnSp>
+      <p:cxnSp>
+        <p:nvCxnSpPr>
+          <p:cNvPr id="99" name="Straight Connector 98"/>
+          <p:cNvCxnSpPr>
+            <a:stCxn id="96" idx="4"/>
+          </p:cNvCxnSpPr>
+          <p:nvPr/>
+        </p:nvCxnSpPr>
+        <p:spPr>
+          <a:xfrm flipH="1">
+            <a:off x="6776122" y="4826000"/>
+            <a:ext cx="5172795" cy="1418297"/>
+          </a:xfrm>
+          <a:prstGeom prst="line">
+            <a:avLst/>
+          </a:prstGeom>
+          <a:ln w="76200">
+            <a:solidFill>
+              <a:schemeClr val="accent1">
+                <a:lumMod val="50000"/>
+              </a:schemeClr>
+            </a:solidFill>
+            <a:prstDash val="sysDash"/>
+          </a:ln>
+        </p:spPr>
+        <p:style>
+          <a:lnRef idx="1">
+            <a:schemeClr val="accent1"/>
+          </a:lnRef>
+          <a:fillRef idx="0">
+            <a:schemeClr val="accent1"/>
+          </a:fillRef>
+          <a:effectRef idx="0">
+            <a:schemeClr val="accent1"/>
+          </a:effectRef>
+          <a:fontRef idx="minor">
+            <a:schemeClr val="tx1"/>
+          </a:fontRef>
+        </p:style>
+      </p:cxnSp>
+      <p:sp>
+        <p:nvSpPr>
+          <p:cNvPr id="101" name="Teardrop 100"/>
+          <p:cNvSpPr>
+            <a:spLocks noChangeAspect="1"/>
+          </p:cNvSpPr>
+          <p:nvPr/>
+        </p:nvSpPr>
+        <p:spPr>
+          <a:xfrm rot="5400000">
+            <a:off x="8231207" y="0"/>
+            <a:ext cx="1179576" cy="1179576"/>
+          </a:xfrm>
+          <a:prstGeom prst="teardrop">
+            <a:avLst/>
+          </a:prstGeom>
+          <a:solidFill>
+            <a:srgbClr val="238B45"/>
+          </a:solidFill>
+          <a:ln>
+            <a:solidFill>
+              <a:schemeClr val="accent1">
+                <a:shade val="50000"/>
+                <a:alpha val="19000"/>
+              </a:schemeClr>
+            </a:solidFill>
+          </a:ln>
+        </p:spPr>
+        <p:style>
+          <a:lnRef idx="2">
+            <a:schemeClr val="accent1">
+              <a:shade val="50000"/>
+            </a:schemeClr>
+          </a:lnRef>
+          <a:fillRef idx="1">
+            <a:schemeClr val="accent1"/>
+          </a:fillRef>
+          <a:effectRef idx="0">
+            <a:schemeClr val="accent1"/>
+          </a:effectRef>
+          <a:fontRef idx="minor">
+            <a:schemeClr val="lt1"/>
+          </a:fontRef>
+        </p:style>
+        <p:txBody>
+          <a:bodyPr vert="vert270" rtlCol="0" anchor="ctr"/>
+          <a:lstStyle/>
+          <a:p>
+            <a:pPr algn="ctr"/>
+            <a:r>
+              <a:rPr lang="en-US" sz="9600" dirty="0"/>
+              <a:t>B</a:t>
+            </a:r>
+          </a:p>
+        </p:txBody>
+      </p:sp>
+      <p:sp>
+        <p:nvSpPr>
+          <p:cNvPr id="95" name="TextBox 94"/>
+          <p:cNvSpPr txBox="1"/>
+          <p:nvPr/>
+        </p:nvSpPr>
+        <p:spPr>
+          <a:xfrm>
+            <a:off x="11396208" y="6121303"/>
+            <a:ext cx="1535164" cy="935242"/>
+          </a:xfrm>
+          <a:prstGeom prst="rect">
+            <a:avLst/>
+          </a:prstGeom>
+          <a:noFill/>
+        </p:spPr>
+        <p:txBody>
+          <a:bodyPr wrap="square" rtlCol="0">
+            <a:spAutoFit/>
+          </a:bodyPr>
+          <a:lstStyle/>
+          <a:p>
+            <a:r>
+              <a:rPr lang="en-US" sz="6000" b="1" dirty="0" smtClean="0">
+                <a:solidFill>
+                  <a:schemeClr val="accent1">
+                    <a:lumMod val="50000"/>
+                  </a:schemeClr>
+                </a:solidFill>
+              </a:rPr>
+              <a:t>Dist</a:t>
+            </a:r>
+            <a:endParaRPr lang="en-US" sz="6000" b="1" dirty="0">
+              <a:solidFill>
+                <a:schemeClr val="accent1">
+                  <a:lumMod val="50000"/>
+                </a:schemeClr>
+              </a:solidFill>
+            </a:endParaRPr>
+          </a:p>
+        </p:txBody>
+      </p:sp>
+      <p:grpSp>
+        <p:nvGrpSpPr>
+          <p:cNvPr id="20" name="Group 19"/>
+          <p:cNvGrpSpPr/>
+          <p:nvPr/>
+        </p:nvGrpSpPr>
+        <p:grpSpPr>
+          <a:xfrm>
+            <a:off x="8932679" y="184435"/>
+            <a:ext cx="5697721" cy="7624360"/>
+            <a:chOff x="8932679" y="184435"/>
+            <a:chExt cx="5697721" cy="7624360"/>
+          </a:xfrm>
+        </p:grpSpPr>
+        <p:grpSp>
+          <p:nvGrpSpPr>
+            <p:cNvPr id="154" name="Group 153"/>
+            <p:cNvGrpSpPr/>
+            <p:nvPr/>
+          </p:nvGrpSpPr>
+          <p:grpSpPr>
+            <a:xfrm>
+              <a:off x="8932679" y="184436"/>
+              <a:ext cx="5697721" cy="7624359"/>
+              <a:chOff x="8958079" y="235236"/>
+              <a:chExt cx="3733803" cy="7624359"/>
+            </a:xfrm>
+          </p:grpSpPr>
+          <p:cxnSp>
+            <p:nvCxnSpPr>
+              <p:cNvPr id="155" name="Straight Connector 154"/>
+              <p:cNvCxnSpPr/>
+              <p:nvPr/>
+            </p:nvCxnSpPr>
+            <p:spPr>
+              <a:xfrm>
+                <a:off x="9330100" y="235236"/>
+                <a:ext cx="3361782" cy="0"/>
+              </a:xfrm>
+              <a:prstGeom prst="line">
+                <a:avLst/>
+              </a:prstGeom>
+              <a:ln w="57150" cap="rnd">
+                <a:solidFill>
+                  <a:srgbClr val="000000">
+                    <a:alpha val="10196"/>
+                  </a:srgbClr>
+                </a:solidFill>
+              </a:ln>
+            </p:spPr>
+            <p:style>
+              <a:lnRef idx="1">
+                <a:schemeClr val="accent1"/>
+              </a:lnRef>
+              <a:fillRef idx="0">
+                <a:schemeClr val="accent1"/>
+              </a:fillRef>
+              <a:effectRef idx="0">
+                <a:schemeClr val="accent1"/>
+              </a:effectRef>
+              <a:fontRef idx="minor">
+                <a:schemeClr val="tx1"/>
+              </a:fontRef>
+            </p:style>
+          </p:cxnSp>
+          <p:cxnSp>
+            <p:nvCxnSpPr>
+              <p:cNvPr id="156" name="Straight Connector 155"/>
+              <p:cNvCxnSpPr/>
+              <p:nvPr/>
+            </p:nvCxnSpPr>
+            <p:spPr>
+              <a:xfrm rot="16200000">
+                <a:off x="10824981" y="3060246"/>
+                <a:ext cx="0" cy="3733803"/>
+              </a:xfrm>
+              <a:prstGeom prst="line">
+                <a:avLst/>
+              </a:prstGeom>
+              <a:ln w="57150" cap="rnd">
+                <a:solidFill>
+                  <a:srgbClr val="000000">
+                    <a:alpha val="10196"/>
+                  </a:srgbClr>
+                </a:solidFill>
+              </a:ln>
+            </p:spPr>
+            <p:style>
+              <a:lnRef idx="1">
+                <a:schemeClr val="accent1"/>
+              </a:lnRef>
+              <a:fillRef idx="0">
+                <a:schemeClr val="accent1"/>
+              </a:fillRef>
+              <a:effectRef idx="0">
+                <a:schemeClr val="accent1"/>
+              </a:effectRef>
+              <a:fontRef idx="minor">
+                <a:schemeClr val="tx1"/>
+              </a:fontRef>
+            </p:style>
+          </p:cxnSp>
+          <p:cxnSp>
+            <p:nvCxnSpPr>
+              <p:cNvPr id="157" name="Straight Connector 156"/>
+              <p:cNvCxnSpPr/>
+              <p:nvPr/>
+            </p:nvCxnSpPr>
+            <p:spPr>
+              <a:xfrm rot="16200000">
+                <a:off x="10824981" y="2473757"/>
+                <a:ext cx="0" cy="3733803"/>
+              </a:xfrm>
+              <a:prstGeom prst="line">
+                <a:avLst/>
+              </a:prstGeom>
+              <a:ln w="57150" cap="rnd">
+                <a:solidFill>
+                  <a:srgbClr val="000000">
+                    <a:alpha val="10196"/>
+                  </a:srgbClr>
+                </a:solidFill>
+              </a:ln>
+            </p:spPr>
+            <p:style>
+              <a:lnRef idx="1">
+                <a:schemeClr val="accent1"/>
+              </a:lnRef>
+              <a:fillRef idx="0">
+                <a:schemeClr val="accent1"/>
+              </a:fillRef>
+              <a:effectRef idx="0">
+                <a:schemeClr val="accent1"/>
+              </a:effectRef>
+              <a:fontRef idx="minor">
+                <a:schemeClr val="tx1"/>
+              </a:fontRef>
+            </p:style>
+          </p:cxnSp>
+          <p:cxnSp>
+            <p:nvCxnSpPr>
+              <p:cNvPr id="158" name="Straight Connector 157"/>
+              <p:cNvCxnSpPr/>
+              <p:nvPr/>
+            </p:nvCxnSpPr>
+            <p:spPr>
+              <a:xfrm rot="16200000">
+                <a:off x="10824981" y="1887268"/>
+                <a:ext cx="0" cy="3733803"/>
+              </a:xfrm>
+              <a:prstGeom prst="line">
+                <a:avLst/>
+              </a:prstGeom>
+              <a:ln w="57150" cap="rnd">
+                <a:solidFill>
+                  <a:srgbClr val="000000">
+                    <a:alpha val="10196"/>
+                  </a:srgbClr>
+                </a:solidFill>
+              </a:ln>
+            </p:spPr>
+            <p:style>
+              <a:lnRef idx="1">
+                <a:schemeClr val="accent1"/>
+              </a:lnRef>
+              <a:fillRef idx="0">
+                <a:schemeClr val="accent1"/>
+              </a:fillRef>
+              <a:effectRef idx="0">
+                <a:schemeClr val="accent1"/>
+              </a:effectRef>
+              <a:fontRef idx="minor">
+                <a:schemeClr val="tx1"/>
+              </a:fontRef>
+            </p:style>
+          </p:cxnSp>
+          <p:cxnSp>
+            <p:nvCxnSpPr>
+              <p:cNvPr id="159" name="Straight Connector 158"/>
+              <p:cNvCxnSpPr/>
+              <p:nvPr/>
+            </p:nvCxnSpPr>
+            <p:spPr>
+              <a:xfrm rot="16200000">
+                <a:off x="10824981" y="1300779"/>
+                <a:ext cx="0" cy="3733803"/>
+              </a:xfrm>
+              <a:prstGeom prst="line">
+                <a:avLst/>
+              </a:prstGeom>
+              <a:ln w="57150" cap="rnd">
+                <a:solidFill>
+                  <a:srgbClr val="000000">
+                    <a:alpha val="10196"/>
+                  </a:srgbClr>
+                </a:solidFill>
+              </a:ln>
+            </p:spPr>
+            <p:style>
+              <a:lnRef idx="1">
+                <a:schemeClr val="accent1"/>
+              </a:lnRef>
+              <a:fillRef idx="0">
+                <a:schemeClr val="accent1"/>
+              </a:fillRef>
+              <a:effectRef idx="0">
+                <a:schemeClr val="accent1"/>
+              </a:effectRef>
+              <a:fontRef idx="minor">
+                <a:schemeClr val="tx1"/>
+              </a:fontRef>
+            </p:style>
+          </p:cxnSp>
+          <p:cxnSp>
+            <p:nvCxnSpPr>
+              <p:cNvPr id="160" name="Straight Connector 159"/>
+              <p:cNvCxnSpPr/>
+              <p:nvPr/>
+            </p:nvCxnSpPr>
+            <p:spPr>
+              <a:xfrm rot="16200000">
+                <a:off x="10824981" y="714290"/>
+                <a:ext cx="0" cy="3733803"/>
+              </a:xfrm>
+              <a:prstGeom prst="line">
+                <a:avLst/>
+              </a:prstGeom>
+              <a:ln w="57150" cap="rnd">
+                <a:solidFill>
+                  <a:srgbClr val="000000">
+                    <a:alpha val="10196"/>
+                  </a:srgbClr>
+                </a:solidFill>
+              </a:ln>
+            </p:spPr>
+            <p:style>
+              <a:lnRef idx="1">
+                <a:schemeClr val="accent1"/>
+              </a:lnRef>
+              <a:fillRef idx="0">
+                <a:schemeClr val="accent1"/>
+              </a:fillRef>
+              <a:effectRef idx="0">
+                <a:schemeClr val="accent1"/>
+              </a:effectRef>
+              <a:fontRef idx="minor">
+                <a:schemeClr val="tx1"/>
+              </a:fontRef>
+            </p:style>
+          </p:cxnSp>
+          <p:cxnSp>
+            <p:nvCxnSpPr>
+              <p:cNvPr id="161" name="Straight Connector 160"/>
+              <p:cNvCxnSpPr/>
+              <p:nvPr/>
+            </p:nvCxnSpPr>
+            <p:spPr>
+              <a:xfrm rot="16200000">
+                <a:off x="10824981" y="127801"/>
+                <a:ext cx="0" cy="3733803"/>
+              </a:xfrm>
+              <a:prstGeom prst="line">
+                <a:avLst/>
+              </a:prstGeom>
+              <a:ln w="57150" cap="rnd">
+                <a:solidFill>
+                  <a:srgbClr val="000000">
+                    <a:alpha val="10196"/>
+                  </a:srgbClr>
+                </a:solidFill>
+              </a:ln>
+            </p:spPr>
+            <p:style>
+              <a:lnRef idx="1">
+                <a:schemeClr val="accent1"/>
+              </a:lnRef>
+              <a:fillRef idx="0">
+                <a:schemeClr val="accent1"/>
+              </a:fillRef>
+              <a:effectRef idx="0">
+                <a:schemeClr val="accent1"/>
+              </a:effectRef>
+              <a:fontRef idx="minor">
+                <a:schemeClr val="tx1"/>
+              </a:fontRef>
+            </p:style>
+          </p:cxnSp>
+          <p:cxnSp>
+            <p:nvCxnSpPr>
+              <p:cNvPr id="162" name="Straight Connector 161"/>
+              <p:cNvCxnSpPr/>
+              <p:nvPr/>
+            </p:nvCxnSpPr>
+            <p:spPr>
+              <a:xfrm>
+                <a:off x="9330100" y="821725"/>
+                <a:ext cx="3361782" cy="0"/>
+              </a:xfrm>
+              <a:prstGeom prst="line">
+                <a:avLst/>
+              </a:prstGeom>
+              <a:ln w="57150" cap="rnd">
+                <a:solidFill>
+                  <a:srgbClr val="000000">
+                    <a:alpha val="10196"/>
+                  </a:srgbClr>
+                </a:solidFill>
+              </a:ln>
+            </p:spPr>
+            <p:style>
+              <a:lnRef idx="1">
+                <a:schemeClr val="accent1"/>
+              </a:lnRef>
+              <a:fillRef idx="0">
+                <a:schemeClr val="accent1"/>
+              </a:fillRef>
+              <a:effectRef idx="0">
+                <a:schemeClr val="accent1"/>
+              </a:effectRef>
+              <a:fontRef idx="minor">
+                <a:schemeClr val="tx1"/>
+              </a:fontRef>
+            </p:style>
+          </p:cxnSp>
+          <p:cxnSp>
+            <p:nvCxnSpPr>
+              <p:cNvPr id="163" name="Straight Connector 162"/>
+              <p:cNvCxnSpPr/>
+              <p:nvPr/>
+            </p:nvCxnSpPr>
+            <p:spPr>
+              <a:xfrm rot="16200000">
+                <a:off x="10824981" y="-458688"/>
+                <a:ext cx="0" cy="3733803"/>
+              </a:xfrm>
+              <a:prstGeom prst="line">
+                <a:avLst/>
+              </a:prstGeom>
+              <a:ln w="57150" cap="rnd">
+                <a:solidFill>
+                  <a:srgbClr val="000000">
+                    <a:alpha val="10196"/>
+                  </a:srgbClr>
+                </a:solidFill>
+              </a:ln>
+            </p:spPr>
+            <p:style>
+              <a:lnRef idx="1">
+                <a:schemeClr val="accent1"/>
+              </a:lnRef>
+              <a:fillRef idx="0">
+                <a:schemeClr val="accent1"/>
+              </a:fillRef>
+              <a:effectRef idx="0">
+                <a:schemeClr val="accent1"/>
+              </a:effectRef>
+              <a:fontRef idx="minor">
+                <a:schemeClr val="tx1"/>
+              </a:fontRef>
+            </p:style>
+          </p:cxnSp>
+          <p:cxnSp>
+            <p:nvCxnSpPr>
+              <p:cNvPr id="164" name="Straight Connector 163"/>
+              <p:cNvCxnSpPr/>
+              <p:nvPr/>
+            </p:nvCxnSpPr>
+            <p:spPr>
+              <a:xfrm rot="16200000">
+                <a:off x="10824981" y="3646735"/>
+                <a:ext cx="0" cy="3733803"/>
+              </a:xfrm>
+              <a:prstGeom prst="line">
+                <a:avLst/>
+              </a:prstGeom>
+              <a:ln w="57150" cap="rnd">
+                <a:solidFill>
+                  <a:srgbClr val="000000">
+                    <a:alpha val="10196"/>
+                  </a:srgbClr>
+                </a:solidFill>
+              </a:ln>
+            </p:spPr>
+            <p:style>
+              <a:lnRef idx="1">
+                <a:schemeClr val="accent1"/>
+              </a:lnRef>
+              <a:fillRef idx="0">
+                <a:schemeClr val="accent1"/>
+              </a:fillRef>
+              <a:effectRef idx="0">
+                <a:schemeClr val="accent1"/>
+              </a:effectRef>
+              <a:fontRef idx="minor">
+                <a:schemeClr val="tx1"/>
+              </a:fontRef>
+            </p:style>
+          </p:cxnSp>
+          <p:cxnSp>
+            <p:nvCxnSpPr>
+              <p:cNvPr id="165" name="Straight Connector 164"/>
+              <p:cNvCxnSpPr/>
+              <p:nvPr/>
+            </p:nvCxnSpPr>
+            <p:spPr>
+              <a:xfrm rot="16200000">
+                <a:off x="10824981" y="4233224"/>
+                <a:ext cx="0" cy="3733803"/>
+              </a:xfrm>
+              <a:prstGeom prst="line">
+                <a:avLst/>
+              </a:prstGeom>
+              <a:ln w="57150" cap="rnd">
+                <a:solidFill>
+                  <a:srgbClr val="000000">
+                    <a:alpha val="10196"/>
+                  </a:srgbClr>
+                </a:solidFill>
+              </a:ln>
+            </p:spPr>
+            <p:style>
+              <a:lnRef idx="1">
+                <a:schemeClr val="accent1"/>
+              </a:lnRef>
+              <a:fillRef idx="0">
+                <a:schemeClr val="accent1"/>
+              </a:fillRef>
+              <a:effectRef idx="0">
+                <a:schemeClr val="accent1"/>
+              </a:effectRef>
+              <a:fontRef idx="minor">
+                <a:schemeClr val="tx1"/>
+              </a:fontRef>
+            </p:style>
+          </p:cxnSp>
+          <p:cxnSp>
+            <p:nvCxnSpPr>
+              <p:cNvPr id="166" name="Straight Connector 165"/>
+              <p:cNvCxnSpPr/>
+              <p:nvPr/>
+            </p:nvCxnSpPr>
+            <p:spPr>
+              <a:xfrm rot="16200000">
+                <a:off x="10824981" y="4819713"/>
+                <a:ext cx="0" cy="3733803"/>
+              </a:xfrm>
+              <a:prstGeom prst="line">
+                <a:avLst/>
+              </a:prstGeom>
+              <a:ln w="57150" cap="rnd">
+                <a:solidFill>
+                  <a:srgbClr val="000000">
+                    <a:alpha val="10196"/>
+                  </a:srgbClr>
+                </a:solidFill>
+              </a:ln>
+            </p:spPr>
+            <p:style>
+              <a:lnRef idx="1">
+                <a:schemeClr val="accent1"/>
+              </a:lnRef>
+              <a:fillRef idx="0">
+                <a:schemeClr val="accent1"/>
+              </a:fillRef>
+              <a:effectRef idx="0">
+                <a:schemeClr val="accent1"/>
+              </a:effectRef>
+              <a:fontRef idx="minor">
+                <a:schemeClr val="tx1"/>
+              </a:fontRef>
+            </p:style>
+          </p:cxnSp>
+          <p:cxnSp>
+            <p:nvCxnSpPr>
+              <p:cNvPr id="167" name="Straight Connector 166"/>
+              <p:cNvCxnSpPr/>
+              <p:nvPr/>
+            </p:nvCxnSpPr>
+            <p:spPr>
+              <a:xfrm rot="16200000">
+                <a:off x="10824981" y="5406202"/>
+                <a:ext cx="0" cy="3733803"/>
+              </a:xfrm>
+              <a:prstGeom prst="line">
+                <a:avLst/>
+              </a:prstGeom>
+              <a:ln w="57150" cap="rnd">
+                <a:solidFill>
+                  <a:srgbClr val="000000">
+                    <a:alpha val="10196"/>
+                  </a:srgbClr>
+                </a:solidFill>
+              </a:ln>
+            </p:spPr>
+            <p:style>
+              <a:lnRef idx="1">
+                <a:schemeClr val="accent1"/>
+              </a:lnRef>
+              <a:fillRef idx="0">
+                <a:schemeClr val="accent1"/>
+              </a:fillRef>
+              <a:effectRef idx="0">
+                <a:schemeClr val="accent1"/>
+              </a:effectRef>
+              <a:fontRef idx="minor">
+                <a:schemeClr val="tx1"/>
+              </a:fontRef>
+            </p:style>
+          </p:cxnSp>
+          <p:cxnSp>
+            <p:nvCxnSpPr>
+              <p:cNvPr id="168" name="Straight Connector 167"/>
+              <p:cNvCxnSpPr/>
+              <p:nvPr/>
+            </p:nvCxnSpPr>
+            <p:spPr>
+              <a:xfrm rot="16200000">
+                <a:off x="10824981" y="5992693"/>
+                <a:ext cx="0" cy="3733803"/>
+              </a:xfrm>
+              <a:prstGeom prst="line">
+                <a:avLst/>
+              </a:prstGeom>
+              <a:ln w="57150" cap="rnd">
+                <a:solidFill>
+                  <a:srgbClr val="000000">
+                    <a:alpha val="10196"/>
+                  </a:srgbClr>
+                </a:solidFill>
+              </a:ln>
+            </p:spPr>
+            <p:style>
+              <a:lnRef idx="1">
+                <a:schemeClr val="accent1"/>
+              </a:lnRef>
+              <a:fillRef idx="0">
+                <a:schemeClr val="accent1"/>
+              </a:fillRef>
+              <a:effectRef idx="0">
+                <a:schemeClr val="accent1"/>
+              </a:effectRef>
+              <a:fontRef idx="minor">
+                <a:schemeClr val="tx1"/>
+              </a:fontRef>
+            </p:style>
+          </p:cxnSp>
+        </p:grpSp>
+        <p:grpSp>
+          <p:nvGrpSpPr>
+            <p:cNvPr id="19" name="Group 18"/>
+            <p:cNvGrpSpPr/>
+            <p:nvPr/>
+          </p:nvGrpSpPr>
+          <p:grpSpPr>
+            <a:xfrm>
+              <a:off x="8932679" y="184435"/>
+              <a:ext cx="5697721" cy="7624360"/>
+              <a:chOff x="8932679" y="184435"/>
+              <a:chExt cx="5697721" cy="7624360"/>
+            </a:xfrm>
+          </p:grpSpPr>
+          <p:cxnSp>
+            <p:nvCxnSpPr>
+              <p:cNvPr id="169" name="Straight Connector 168"/>
+              <p:cNvCxnSpPr/>
+              <p:nvPr/>
+            </p:nvCxnSpPr>
+            <p:spPr>
+              <a:xfrm>
+                <a:off x="14041956" y="184436"/>
+                <a:ext cx="0" cy="7624359"/>
+              </a:xfrm>
+              <a:prstGeom prst="line">
+                <a:avLst/>
+              </a:prstGeom>
+              <a:ln w="57150" cap="rnd">
+                <a:solidFill>
+                  <a:srgbClr val="000000">
+                    <a:alpha val="10196"/>
+                  </a:srgbClr>
+                </a:solidFill>
+              </a:ln>
+            </p:spPr>
+            <p:style>
+              <a:lnRef idx="1">
+                <a:schemeClr val="accent1"/>
+              </a:lnRef>
+              <a:fillRef idx="0">
+                <a:schemeClr val="accent1"/>
+              </a:fillRef>
+              <a:effectRef idx="0">
+                <a:schemeClr val="accent1"/>
+              </a:effectRef>
+              <a:fontRef idx="minor">
+                <a:schemeClr val="tx1"/>
+              </a:fontRef>
+            </p:style>
+          </p:cxnSp>
+          <p:cxnSp>
+            <p:nvCxnSpPr>
+              <p:cNvPr id="170" name="Straight Connector 169"/>
+              <p:cNvCxnSpPr/>
+              <p:nvPr/>
+            </p:nvCxnSpPr>
+            <p:spPr>
+              <a:xfrm>
+                <a:off x="10635772" y="184436"/>
+                <a:ext cx="0" cy="7624359"/>
+              </a:xfrm>
+              <a:prstGeom prst="line">
+                <a:avLst/>
+              </a:prstGeom>
+              <a:ln w="57150" cap="rnd">
+                <a:solidFill>
+                  <a:srgbClr val="000000">
+                    <a:alpha val="10196"/>
+                  </a:srgbClr>
+                </a:solidFill>
+              </a:ln>
+            </p:spPr>
+            <p:style>
+              <a:lnRef idx="1">
+                <a:schemeClr val="accent1"/>
+              </a:lnRef>
+              <a:fillRef idx="0">
+                <a:schemeClr val="accent1"/>
+              </a:fillRef>
+              <a:effectRef idx="0">
+                <a:schemeClr val="accent1"/>
+              </a:effectRef>
+              <a:fontRef idx="minor">
+                <a:schemeClr val="tx1"/>
+              </a:fontRef>
+            </p:style>
+          </p:cxnSp>
+          <p:cxnSp>
+            <p:nvCxnSpPr>
+              <p:cNvPr id="171" name="Straight Connector 170"/>
+              <p:cNvCxnSpPr/>
+              <p:nvPr/>
+            </p:nvCxnSpPr>
+            <p:spPr>
+              <a:xfrm>
+                <a:off x="11203469" y="184436"/>
+                <a:ext cx="0" cy="7624359"/>
+              </a:xfrm>
+              <a:prstGeom prst="line">
+                <a:avLst/>
+              </a:prstGeom>
+              <a:ln w="57150" cap="rnd">
+                <a:solidFill>
+                  <a:srgbClr val="000000">
+                    <a:alpha val="10196"/>
+                  </a:srgbClr>
+                </a:solidFill>
+              </a:ln>
+            </p:spPr>
+            <p:style>
+              <a:lnRef idx="1">
+                <a:schemeClr val="accent1"/>
+              </a:lnRef>
+              <a:fillRef idx="0">
+                <a:schemeClr val="accent1"/>
+              </a:fillRef>
+              <a:effectRef idx="0">
+                <a:schemeClr val="accent1"/>
+              </a:effectRef>
+              <a:fontRef idx="minor">
+                <a:schemeClr val="tx1"/>
+              </a:fontRef>
+            </p:style>
+          </p:cxnSp>
+          <p:cxnSp>
+            <p:nvCxnSpPr>
+              <p:cNvPr id="172" name="Straight Connector 171"/>
+              <p:cNvCxnSpPr/>
+              <p:nvPr/>
+            </p:nvCxnSpPr>
+            <p:spPr>
+              <a:xfrm>
+                <a:off x="11771167" y="184436"/>
+                <a:ext cx="0" cy="7624359"/>
+              </a:xfrm>
+              <a:prstGeom prst="line">
+                <a:avLst/>
+              </a:prstGeom>
+              <a:ln w="57150" cap="rnd">
+                <a:solidFill>
+                  <a:srgbClr val="000000">
+                    <a:alpha val="10196"/>
+                  </a:srgbClr>
+                </a:solidFill>
+              </a:ln>
+            </p:spPr>
+            <p:style>
+              <a:lnRef idx="1">
+                <a:schemeClr val="accent1"/>
+              </a:lnRef>
+              <a:fillRef idx="0">
+                <a:schemeClr val="accent1"/>
+              </a:fillRef>
+              <a:effectRef idx="0">
+                <a:schemeClr val="accent1"/>
+              </a:effectRef>
+              <a:fontRef idx="minor">
+                <a:schemeClr val="tx1"/>
+              </a:fontRef>
+            </p:style>
+          </p:cxnSp>
+          <p:cxnSp>
+            <p:nvCxnSpPr>
+              <p:cNvPr id="173" name="Straight Connector 172"/>
+              <p:cNvCxnSpPr/>
+              <p:nvPr/>
+            </p:nvCxnSpPr>
+            <p:spPr>
+              <a:xfrm>
+                <a:off x="12338864" y="184436"/>
+                <a:ext cx="0" cy="7624359"/>
+              </a:xfrm>
+              <a:prstGeom prst="line">
+                <a:avLst/>
+              </a:prstGeom>
+              <a:ln w="57150" cap="rnd">
+                <a:solidFill>
+                  <a:srgbClr val="000000">
+                    <a:alpha val="10196"/>
+                  </a:srgbClr>
+                </a:solidFill>
+              </a:ln>
+            </p:spPr>
+            <p:style>
+              <a:lnRef idx="1">
+                <a:schemeClr val="accent1"/>
+              </a:lnRef>
+              <a:fillRef idx="0">
+                <a:schemeClr val="accent1"/>
+              </a:fillRef>
+              <a:effectRef idx="0">
+                <a:schemeClr val="accent1"/>
+              </a:effectRef>
+              <a:fontRef idx="minor">
+                <a:schemeClr val="tx1"/>
+              </a:fontRef>
+            </p:style>
+          </p:cxnSp>
+          <p:cxnSp>
+            <p:nvCxnSpPr>
+              <p:cNvPr id="174" name="Straight Connector 173"/>
+              <p:cNvCxnSpPr/>
+              <p:nvPr/>
+            </p:nvCxnSpPr>
+            <p:spPr>
+              <a:xfrm>
+                <a:off x="12906562" y="184436"/>
+                <a:ext cx="0" cy="7624359"/>
+              </a:xfrm>
+              <a:prstGeom prst="line">
+                <a:avLst/>
+              </a:prstGeom>
+              <a:ln w="57150" cap="rnd">
+                <a:solidFill>
+                  <a:srgbClr val="000000">
+                    <a:alpha val="10196"/>
+                  </a:srgbClr>
+                </a:solidFill>
+              </a:ln>
+            </p:spPr>
+            <p:style>
+              <a:lnRef idx="1">
+                <a:schemeClr val="accent1"/>
+              </a:lnRef>
+              <a:fillRef idx="0">
+                <a:schemeClr val="accent1"/>
+              </a:fillRef>
+              <a:effectRef idx="0">
+                <a:schemeClr val="accent1"/>
+              </a:effectRef>
+              <a:fontRef idx="minor">
+                <a:schemeClr val="tx1"/>
+              </a:fontRef>
+            </p:style>
+          </p:cxnSp>
+          <p:cxnSp>
+            <p:nvCxnSpPr>
+              <p:cNvPr id="175" name="Straight Connector 174"/>
+              <p:cNvCxnSpPr/>
+              <p:nvPr/>
+            </p:nvCxnSpPr>
+            <p:spPr>
+              <a:xfrm>
+                <a:off x="13474259" y="184436"/>
+                <a:ext cx="0" cy="7624359"/>
+              </a:xfrm>
+              <a:prstGeom prst="line">
+                <a:avLst/>
+              </a:prstGeom>
+              <a:ln w="57150" cap="rnd">
+                <a:solidFill>
+                  <a:srgbClr val="000000">
+                    <a:alpha val="10196"/>
+                  </a:srgbClr>
+                </a:solidFill>
+              </a:ln>
+            </p:spPr>
+            <p:style>
+              <a:lnRef idx="1">
+                <a:schemeClr val="accent1"/>
+              </a:lnRef>
+              <a:fillRef idx="0">
+                <a:schemeClr val="accent1"/>
+              </a:fillRef>
+              <a:effectRef idx="0">
+                <a:schemeClr val="accent1"/>
+              </a:effectRef>
+              <a:fontRef idx="minor">
+                <a:schemeClr val="tx1"/>
+              </a:fontRef>
+            </p:style>
+          </p:cxnSp>
+          <p:cxnSp>
+            <p:nvCxnSpPr>
+              <p:cNvPr id="176" name="Straight Connector 175"/>
+              <p:cNvCxnSpPr/>
+              <p:nvPr/>
+            </p:nvCxnSpPr>
+            <p:spPr>
+              <a:xfrm>
+                <a:off x="10068074" y="184436"/>
+                <a:ext cx="0" cy="7624359"/>
+              </a:xfrm>
+              <a:prstGeom prst="line">
+                <a:avLst/>
+              </a:prstGeom>
+              <a:ln w="57150" cap="rnd">
+                <a:solidFill>
+                  <a:srgbClr val="000000">
+                    <a:alpha val="10196"/>
+                  </a:srgbClr>
+                </a:solidFill>
+              </a:ln>
+            </p:spPr>
+            <p:style>
+              <a:lnRef idx="1">
+                <a:schemeClr val="accent1"/>
+              </a:lnRef>
+              <a:fillRef idx="0">
+                <a:schemeClr val="accent1"/>
+              </a:fillRef>
+              <a:effectRef idx="0">
+                <a:schemeClr val="accent1"/>
+              </a:effectRef>
+              <a:fontRef idx="minor">
+                <a:schemeClr val="tx1"/>
+              </a:fontRef>
+            </p:style>
+          </p:cxnSp>
+          <p:cxnSp>
+            <p:nvCxnSpPr>
+              <p:cNvPr id="177" name="Straight Connector 176"/>
+              <p:cNvCxnSpPr/>
+              <p:nvPr/>
+            </p:nvCxnSpPr>
+            <p:spPr>
+              <a:xfrm>
+                <a:off x="9500377" y="184436"/>
+                <a:ext cx="0" cy="7624359"/>
+              </a:xfrm>
+              <a:prstGeom prst="line">
+                <a:avLst/>
+              </a:prstGeom>
+              <a:ln w="57150" cap="rnd">
+                <a:solidFill>
+                  <a:srgbClr val="000000">
+                    <a:alpha val="10196"/>
+                  </a:srgbClr>
+                </a:solidFill>
+              </a:ln>
+            </p:spPr>
+            <p:style>
+              <a:lnRef idx="1">
+                <a:schemeClr val="accent1"/>
+              </a:lnRef>
+              <a:fillRef idx="0">
+                <a:schemeClr val="accent1"/>
+              </a:fillRef>
+              <a:effectRef idx="0">
+                <a:schemeClr val="accent1"/>
+              </a:effectRef>
+              <a:fontRef idx="minor">
+                <a:schemeClr val="tx1"/>
+              </a:fontRef>
+            </p:style>
+          </p:cxnSp>
+          <p:cxnSp>
+            <p:nvCxnSpPr>
+              <p:cNvPr id="178" name="Straight Connector 177"/>
+              <p:cNvCxnSpPr/>
+              <p:nvPr/>
+            </p:nvCxnSpPr>
+            <p:spPr>
+              <a:xfrm>
+                <a:off x="8932679" y="1357414"/>
+                <a:ext cx="0" cy="6451381"/>
+              </a:xfrm>
+              <a:prstGeom prst="line">
+                <a:avLst/>
+              </a:prstGeom>
+              <a:ln w="57150" cap="rnd">
+                <a:solidFill>
+                  <a:srgbClr val="000000">
+                    <a:alpha val="10196"/>
+                  </a:srgbClr>
+                </a:solidFill>
+              </a:ln>
+            </p:spPr>
+            <p:style>
+              <a:lnRef idx="1">
+                <a:schemeClr val="accent1"/>
+              </a:lnRef>
+              <a:fillRef idx="0">
+                <a:schemeClr val="accent1"/>
+              </a:fillRef>
+              <a:effectRef idx="0">
+                <a:schemeClr val="accent1"/>
+              </a:effectRef>
+              <a:fontRef idx="minor">
+                <a:schemeClr val="tx1"/>
+              </a:fontRef>
+            </p:style>
+          </p:cxnSp>
+          <p:cxnSp>
+            <p:nvCxnSpPr>
+              <p:cNvPr id="179" name="Straight Connector 178"/>
+              <p:cNvCxnSpPr/>
+              <p:nvPr/>
+            </p:nvCxnSpPr>
+            <p:spPr>
+              <a:xfrm>
+                <a:off x="14630400" y="184435"/>
+                <a:ext cx="0" cy="7624359"/>
+              </a:xfrm>
+              <a:prstGeom prst="line">
+                <a:avLst/>
+              </a:prstGeom>
+              <a:ln w="57150" cap="rnd">
+                <a:solidFill>
+                  <a:srgbClr val="000000">
+                    <a:alpha val="10196"/>
+                  </a:srgbClr>
+                </a:solidFill>
+              </a:ln>
+            </p:spPr>
+            <p:style>
+              <a:lnRef idx="1">
+                <a:schemeClr val="accent1"/>
+              </a:lnRef>
+              <a:fillRef idx="0">
+                <a:schemeClr val="accent1"/>
+              </a:fillRef>
+              <a:effectRef idx="0">
+                <a:schemeClr val="accent1"/>
+              </a:effectRef>
+              <a:fontRef idx="minor">
+                <a:schemeClr val="tx1"/>
+              </a:fontRef>
+            </p:style>
+          </p:cxnSp>
+        </p:grpSp>
+      </p:grpSp>
     </p:spTree>
     <p:extLst>
       <p:ext uri="{BB962C8B-B14F-4D97-AF65-F5344CB8AC3E}">

</xml_diff>